<commit_message>
Update 3 & 16
</commit_message>
<xml_diff>
--- a/16合神心意的敬拜.pptx
+++ b/16合神心意的敬拜.pptx
@@ -309,7 +309,7 @@
             <a:fld id="{86B5546F-C09B-4E63-ABC5-F7C86A7E8D66}" type="datetimeFigureOut">
               <a:rPr lang="en-US" smtClean="0"/>
               <a:pPr/>
-              <a:t>12/24/2020</a:t>
+              <a:t>3/19/2023</a:t>
             </a:fld>
             <a:endParaRPr lang="en-US"/>
           </a:p>
@@ -481,7 +481,7 @@
             <a:fld id="{86B5546F-C09B-4E63-ABC5-F7C86A7E8D66}" type="datetimeFigureOut">
               <a:rPr lang="en-US" smtClean="0"/>
               <a:pPr/>
-              <a:t>12/24/2020</a:t>
+              <a:t>3/19/2023</a:t>
             </a:fld>
             <a:endParaRPr lang="en-US"/>
           </a:p>
@@ -663,7 +663,7 @@
             <a:fld id="{86B5546F-C09B-4E63-ABC5-F7C86A7E8D66}" type="datetimeFigureOut">
               <a:rPr lang="en-US" smtClean="0"/>
               <a:pPr/>
-              <a:t>12/24/2020</a:t>
+              <a:t>3/19/2023</a:t>
             </a:fld>
             <a:endParaRPr lang="en-US"/>
           </a:p>
@@ -835,7 +835,7 @@
             <a:fld id="{86B5546F-C09B-4E63-ABC5-F7C86A7E8D66}" type="datetimeFigureOut">
               <a:rPr lang="en-US" smtClean="0"/>
               <a:pPr/>
-              <a:t>12/24/2020</a:t>
+              <a:t>3/19/2023</a:t>
             </a:fld>
             <a:endParaRPr lang="en-US"/>
           </a:p>
@@ -1083,7 +1083,7 @@
             <a:fld id="{86B5546F-C09B-4E63-ABC5-F7C86A7E8D66}" type="datetimeFigureOut">
               <a:rPr lang="en-US" smtClean="0"/>
               <a:pPr/>
-              <a:t>12/24/2020</a:t>
+              <a:t>3/19/2023</a:t>
             </a:fld>
             <a:endParaRPr lang="en-US"/>
           </a:p>
@@ -1373,7 +1373,7 @@
             <a:fld id="{86B5546F-C09B-4E63-ABC5-F7C86A7E8D66}" type="datetimeFigureOut">
               <a:rPr lang="en-US" smtClean="0"/>
               <a:pPr/>
-              <a:t>12/24/2020</a:t>
+              <a:t>3/19/2023</a:t>
             </a:fld>
             <a:endParaRPr lang="en-US"/>
           </a:p>
@@ -1797,7 +1797,7 @@
             <a:fld id="{86B5546F-C09B-4E63-ABC5-F7C86A7E8D66}" type="datetimeFigureOut">
               <a:rPr lang="en-US" smtClean="0"/>
               <a:pPr/>
-              <a:t>12/24/2020</a:t>
+              <a:t>3/19/2023</a:t>
             </a:fld>
             <a:endParaRPr lang="en-US"/>
           </a:p>
@@ -1917,7 +1917,7 @@
             <a:fld id="{86B5546F-C09B-4E63-ABC5-F7C86A7E8D66}" type="datetimeFigureOut">
               <a:rPr lang="en-US" smtClean="0"/>
               <a:pPr/>
-              <a:t>12/24/2020</a:t>
+              <a:t>3/19/2023</a:t>
             </a:fld>
             <a:endParaRPr lang="en-US"/>
           </a:p>
@@ -2014,7 +2014,7 @@
             <a:fld id="{86B5546F-C09B-4E63-ABC5-F7C86A7E8D66}" type="datetimeFigureOut">
               <a:rPr lang="en-US" smtClean="0"/>
               <a:pPr/>
-              <a:t>12/24/2020</a:t>
+              <a:t>3/19/2023</a:t>
             </a:fld>
             <a:endParaRPr lang="en-US"/>
           </a:p>
@@ -2293,7 +2293,7 @@
             <a:fld id="{86B5546F-C09B-4E63-ABC5-F7C86A7E8D66}" type="datetimeFigureOut">
               <a:rPr lang="en-US" smtClean="0"/>
               <a:pPr/>
-              <a:t>12/24/2020</a:t>
+              <a:t>3/19/2023</a:t>
             </a:fld>
             <a:endParaRPr lang="en-US"/>
           </a:p>
@@ -2552,7 +2552,7 @@
             <a:fld id="{86B5546F-C09B-4E63-ABC5-F7C86A7E8D66}" type="datetimeFigureOut">
               <a:rPr lang="en-US" smtClean="0"/>
               <a:pPr/>
-              <a:t>12/24/2020</a:t>
+              <a:t>3/19/2023</a:t>
             </a:fld>
             <a:endParaRPr lang="en-US"/>
           </a:p>
@@ -2772,7 +2772,7 @@
             <a:fld id="{86B5546F-C09B-4E63-ABC5-F7C86A7E8D66}" type="datetimeFigureOut">
               <a:rPr lang="en-US" smtClean="0"/>
               <a:pPr/>
-              <a:t>12/24/2020</a:t>
+              <a:t>3/19/2023</a:t>
             </a:fld>
             <a:endParaRPr lang="en-US"/>
           </a:p>
@@ -3509,7 +3509,37 @@
                 <a:latin typeface="微軟正黑體" pitchFamily="34" charset="-120"/>
                 <a:ea typeface="微軟正黑體" pitchFamily="34" charset="-120"/>
               </a:rPr>
-              <a:t>我要歌唱耶和華的慈愛，直到永遠；我要用口將你的信實傳與萬代。</a:t>
+              <a:t>我要歌唱耶和華的慈愛，直到永遠；我要用口</a:t>
+            </a:r>
+            <a:r>
+              <a:rPr lang="zh-TW" altLang="en-US" sz="6400" dirty="0" smtClean="0">
+                <a:solidFill>
+                  <a:srgbClr val="660033"/>
+                </a:solidFill>
+                <a:latin typeface="微軟正黑體" pitchFamily="34" charset="-120"/>
+                <a:ea typeface="微軟正黑體" pitchFamily="34" charset="-120"/>
+              </a:rPr>
+              <a:t>將祢</a:t>
+            </a:r>
+            <a:r>
+              <a:rPr lang="zh-TW" altLang="en-US" sz="6400" dirty="0">
+                <a:solidFill>
+                  <a:srgbClr val="660033"/>
+                </a:solidFill>
+                <a:latin typeface="微軟正黑體" pitchFamily="34" charset="-120"/>
+                <a:ea typeface="微軟正黑體" pitchFamily="34" charset="-120"/>
+              </a:rPr>
+              <a:t>的</a:t>
+            </a:r>
+            <a:r>
+              <a:rPr lang="zh-TW" altLang="en-US" sz="6400" dirty="0">
+                <a:solidFill>
+                  <a:srgbClr val="660033"/>
+                </a:solidFill>
+                <a:latin typeface="微軟正黑體" pitchFamily="34" charset="-120"/>
+                <a:ea typeface="微軟正黑體" pitchFamily="34" charset="-120"/>
+              </a:rPr>
+              <a:t>信實傳與萬代。</a:t>
             </a:r>
             <a:endParaRPr lang="en-US" altLang="zh-TW" sz="6400" dirty="0">
               <a:solidFill>
@@ -3607,7 +3637,167 @@
                 <a:latin typeface="微軟正黑體" pitchFamily="34" charset="-120"/>
                 <a:ea typeface="微軟正黑體" pitchFamily="34" charset="-120"/>
               </a:rPr>
-              <a:t>當稱謝進入他的門；當讚美進入他的院。當感謝他，稱頌他的名！</a:t>
+              <a:t>當稱謝進</a:t>
+            </a:r>
+            <a:r>
+              <a:rPr lang="zh-TW" altLang="en-US" sz="6400" dirty="0" smtClean="0">
+                <a:solidFill>
+                  <a:srgbClr val="660033"/>
+                </a:solidFill>
+                <a:latin typeface="微軟正黑體" pitchFamily="34" charset="-120"/>
+                <a:ea typeface="微軟正黑體" pitchFamily="34" charset="-120"/>
+              </a:rPr>
+              <a:t>入</a:t>
+            </a:r>
+            <a:r>
+              <a:rPr lang="zh-CN" altLang="en-US" sz="6400" dirty="0" smtClean="0">
+                <a:solidFill>
+                  <a:srgbClr val="660033"/>
+                </a:solidFill>
+                <a:latin typeface="微軟正黑體" pitchFamily="34" charset="-120"/>
+                <a:ea typeface="微軟正黑體" pitchFamily="34" charset="-120"/>
+              </a:rPr>
+              <a:t>祂</a:t>
+            </a:r>
+            <a:r>
+              <a:rPr lang="zh-TW" altLang="en-US" sz="6400" dirty="0" smtClean="0">
+                <a:solidFill>
+                  <a:srgbClr val="660033"/>
+                </a:solidFill>
+                <a:latin typeface="微軟正黑體" pitchFamily="34" charset="-120"/>
+                <a:ea typeface="微軟正黑體" pitchFamily="34" charset="-120"/>
+              </a:rPr>
+              <a:t>的</a:t>
+            </a:r>
+            <a:r>
+              <a:rPr lang="zh-TW" altLang="en-US" sz="6400" dirty="0">
+                <a:solidFill>
+                  <a:srgbClr val="660033"/>
+                </a:solidFill>
+                <a:latin typeface="微軟正黑體" pitchFamily="34" charset="-120"/>
+                <a:ea typeface="微軟正黑體" pitchFamily="34" charset="-120"/>
+              </a:rPr>
+              <a:t>門；當讚美進</a:t>
+            </a:r>
+            <a:r>
+              <a:rPr lang="zh-TW" altLang="en-US" sz="6400" dirty="0" smtClean="0">
+                <a:solidFill>
+                  <a:srgbClr val="660033"/>
+                </a:solidFill>
+                <a:latin typeface="微軟正黑體" pitchFamily="34" charset="-120"/>
+                <a:ea typeface="微軟正黑體" pitchFamily="34" charset="-120"/>
+              </a:rPr>
+              <a:t>入</a:t>
+            </a:r>
+            <a:r>
+              <a:rPr lang="zh-CN" altLang="en-US" sz="6400" dirty="0">
+                <a:solidFill>
+                  <a:srgbClr val="660033"/>
+                </a:solidFill>
+                <a:latin typeface="微軟正黑體" pitchFamily="34" charset="-120"/>
+                <a:ea typeface="微軟正黑體" pitchFamily="34" charset="-120"/>
+              </a:rPr>
+              <a:t>祂</a:t>
+            </a:r>
+            <a:r>
+              <a:rPr lang="zh-TW" altLang="en-US" sz="6400" dirty="0" smtClean="0">
+                <a:solidFill>
+                  <a:srgbClr val="660033"/>
+                </a:solidFill>
+                <a:latin typeface="微軟正黑體" pitchFamily="34" charset="-120"/>
+                <a:ea typeface="微軟正黑體" pitchFamily="34" charset="-120"/>
+              </a:rPr>
+              <a:t>的</a:t>
+            </a:r>
+            <a:r>
+              <a:rPr lang="zh-TW" altLang="en-US" sz="6400" dirty="0">
+                <a:solidFill>
+                  <a:srgbClr val="660033"/>
+                </a:solidFill>
+                <a:latin typeface="微軟正黑體" pitchFamily="34" charset="-120"/>
+                <a:ea typeface="微軟正黑體" pitchFamily="34" charset="-120"/>
+              </a:rPr>
+              <a:t>院。當感</a:t>
+            </a:r>
+            <a:r>
+              <a:rPr lang="zh-TW" altLang="en-US" sz="6400" dirty="0" smtClean="0">
+                <a:solidFill>
+                  <a:srgbClr val="660033"/>
+                </a:solidFill>
+                <a:latin typeface="微軟正黑體" pitchFamily="34" charset="-120"/>
+                <a:ea typeface="微軟正黑體" pitchFamily="34" charset="-120"/>
+              </a:rPr>
+              <a:t>謝</a:t>
+            </a:r>
+            <a:r>
+              <a:rPr lang="zh-CN" altLang="en-US" sz="6400" dirty="0">
+                <a:solidFill>
+                  <a:srgbClr val="660033"/>
+                </a:solidFill>
+                <a:latin typeface="微軟正黑體" pitchFamily="34" charset="-120"/>
+                <a:ea typeface="微軟正黑體" pitchFamily="34" charset="-120"/>
+              </a:rPr>
+              <a:t>祂</a:t>
+            </a:r>
+            <a:r>
+              <a:rPr lang="zh-TW" altLang="en-US" sz="6400" dirty="0" smtClean="0">
+                <a:solidFill>
+                  <a:srgbClr val="660033"/>
+                </a:solidFill>
+                <a:latin typeface="微軟正黑體" pitchFamily="34" charset="-120"/>
+                <a:ea typeface="微軟正黑體" pitchFamily="34" charset="-120"/>
+              </a:rPr>
+              <a:t>，</a:t>
+            </a:r>
+            <a:r>
+              <a:rPr lang="zh-TW" altLang="en-US" sz="6400" dirty="0">
+                <a:solidFill>
+                  <a:srgbClr val="660033"/>
+                </a:solidFill>
+                <a:latin typeface="微軟正黑體" pitchFamily="34" charset="-120"/>
+                <a:ea typeface="微軟正黑體" pitchFamily="34" charset="-120"/>
+              </a:rPr>
+              <a:t>稱</a:t>
+            </a:r>
+            <a:r>
+              <a:rPr lang="zh-TW" altLang="en-US" sz="6400" dirty="0" smtClean="0">
+                <a:solidFill>
+                  <a:srgbClr val="660033"/>
+                </a:solidFill>
+                <a:latin typeface="微軟正黑體" pitchFamily="34" charset="-120"/>
+                <a:ea typeface="微軟正黑體" pitchFamily="34" charset="-120"/>
+              </a:rPr>
+              <a:t>頌</a:t>
+            </a:r>
+            <a:r>
+              <a:rPr lang="zh-CN" altLang="en-US" sz="6400" dirty="0">
+                <a:solidFill>
+                  <a:srgbClr val="660033"/>
+                </a:solidFill>
+                <a:latin typeface="微軟正黑體" pitchFamily="34" charset="-120"/>
+                <a:ea typeface="微軟正黑體" pitchFamily="34" charset="-120"/>
+              </a:rPr>
+              <a:t>祂</a:t>
+            </a:r>
+            <a:r>
+              <a:rPr lang="zh-TW" altLang="en-US" sz="6400" dirty="0" smtClean="0">
+                <a:solidFill>
+                  <a:srgbClr val="660033"/>
+                </a:solidFill>
+                <a:latin typeface="微軟正黑體" pitchFamily="34" charset="-120"/>
+                <a:ea typeface="微軟正黑體" pitchFamily="34" charset="-120"/>
+              </a:rPr>
+              <a:t>的</a:t>
+            </a:r>
+            <a:r>
+              <a:rPr lang="zh-TW" altLang="en-US" sz="6400" dirty="0">
+                <a:solidFill>
+                  <a:srgbClr val="660033"/>
+                </a:solidFill>
+                <a:latin typeface="微軟正黑體" pitchFamily="34" charset="-120"/>
+                <a:ea typeface="微軟正黑體" pitchFamily="34" charset="-120"/>
+              </a:rPr>
+              <a:t>名！</a:t>
             </a:r>
             <a:endParaRPr lang="en-US" altLang="zh-TW" sz="6400" dirty="0">
               <a:solidFill>
@@ -3626,7 +3816,57 @@
                 <a:latin typeface="微軟正黑體" pitchFamily="34" charset="-120"/>
                 <a:ea typeface="微軟正黑體" pitchFamily="34" charset="-120"/>
               </a:rPr>
-              <a:t>誰能登耶和華的山？誰能站在他的聖所？</a:t>
+              <a:t>誰</a:t>
+            </a:r>
+            <a:r>
+              <a:rPr lang="zh-TW" altLang="en-US" sz="6400" b="1" dirty="0">
+                <a:solidFill>
+                  <a:srgbClr val="660033"/>
+                </a:solidFill>
+                <a:latin typeface="微軟正黑體" pitchFamily="34" charset="-120"/>
+                <a:ea typeface="微軟正黑體" pitchFamily="34" charset="-120"/>
+              </a:rPr>
+              <a:t>能登耶和華的山？誰能站</a:t>
+            </a:r>
+            <a:r>
+              <a:rPr lang="zh-TW" altLang="en-US" sz="6400" b="1" dirty="0">
+                <a:solidFill>
+                  <a:srgbClr val="660033"/>
+                </a:solidFill>
+                <a:latin typeface="微軟正黑體" pitchFamily="34" charset="-120"/>
+                <a:ea typeface="微軟正黑體" pitchFamily="34" charset="-120"/>
+              </a:rPr>
+              <a:t>在</a:t>
+            </a:r>
+            <a:r>
+              <a:rPr lang="zh-CN" altLang="en-US" sz="6400" b="1" dirty="0">
+                <a:solidFill>
+                  <a:srgbClr val="660033"/>
+                </a:solidFill>
+                <a:latin typeface="微軟正黑體" pitchFamily="34" charset="-120"/>
+                <a:ea typeface="微軟正黑體" pitchFamily="34" charset="-120"/>
+              </a:rPr>
+              <a:t>祂</a:t>
+            </a:r>
+            <a:r>
+              <a:rPr lang="zh-TW" altLang="en-US" sz="6400" b="1" dirty="0" smtClean="0">
+                <a:solidFill>
+                  <a:srgbClr val="660033"/>
+                </a:solidFill>
+                <a:latin typeface="微軟正黑體" pitchFamily="34" charset="-120"/>
+                <a:ea typeface="微軟正黑體" pitchFamily="34" charset="-120"/>
+              </a:rPr>
+              <a:t>的</a:t>
+            </a:r>
+            <a:r>
+              <a:rPr lang="zh-TW" altLang="en-US" sz="6400" b="1" dirty="0">
+                <a:solidFill>
+                  <a:srgbClr val="660033"/>
+                </a:solidFill>
+                <a:latin typeface="微軟正黑體" pitchFamily="34" charset="-120"/>
+                <a:ea typeface="微軟正黑體" pitchFamily="34" charset="-120"/>
+              </a:rPr>
+              <a:t>聖所？</a:t>
             </a:r>
             <a:r>
               <a:rPr lang="en-US" altLang="zh-TW" sz="6400" b="1" dirty="0">
@@ -3737,7 +3977,7 @@
                 <a:latin typeface="微軟正黑體" pitchFamily="34" charset="-120"/>
                 <a:ea typeface="微軟正黑體" pitchFamily="34" charset="-120"/>
               </a:rPr>
-              <a:t>他</a:t>
+              <a:t>他必</a:t>
             </a:r>
             <a:r>
               <a:rPr lang="zh-TW" altLang="en-US" sz="6400" b="1" dirty="0">
@@ -3747,7 +3987,7 @@
                 <a:latin typeface="微軟正黑體" pitchFamily="34" charset="-120"/>
                 <a:ea typeface="微軟正黑體" pitchFamily="34" charset="-120"/>
               </a:rPr>
-              <a:t>必蒙耶和華賜福，又蒙救他的神使他成義</a:t>
+              <a:t>蒙耶和華賜福，又蒙救他的神使他成義</a:t>
             </a:r>
             <a:r>
               <a:rPr lang="zh-TW" altLang="en-US" sz="6400" b="1" dirty="0" smtClean="0">
@@ -3836,7 +4076,87 @@
                 <a:latin typeface="微軟正黑體" pitchFamily="34" charset="-120"/>
                 <a:ea typeface="微軟正黑體" pitchFamily="34" charset="-120"/>
               </a:rPr>
-              <a:t>時候將到，如今就是了，那真正拜父的，要用心靈和誠實拜他，因為父要這樣的人拜他。」</a:t>
+              <a:t>時候將到，如今就是了，那真正拜父的，要用心靈和誠實</a:t>
+            </a:r>
+            <a:r>
+              <a:rPr lang="zh-TW" altLang="en-US" sz="6400" dirty="0" smtClean="0">
+                <a:solidFill>
+                  <a:srgbClr val="660033"/>
+                </a:solidFill>
+                <a:latin typeface="微軟正黑體" pitchFamily="34" charset="-120"/>
+                <a:ea typeface="微軟正黑體" pitchFamily="34" charset="-120"/>
+              </a:rPr>
+              <a:t>拜</a:t>
+            </a:r>
+            <a:r>
+              <a:rPr lang="zh-CN" altLang="en-US" sz="6400" dirty="0">
+                <a:solidFill>
+                  <a:srgbClr val="660033"/>
+                </a:solidFill>
+                <a:latin typeface="微軟正黑體" pitchFamily="34" charset="-120"/>
+                <a:ea typeface="微軟正黑體" pitchFamily="34" charset="-120"/>
+              </a:rPr>
+              <a:t>祂</a:t>
+            </a:r>
+            <a:r>
+              <a:rPr lang="zh-TW" altLang="en-US" sz="6400" dirty="0" smtClean="0">
+                <a:solidFill>
+                  <a:srgbClr val="660033"/>
+                </a:solidFill>
+                <a:latin typeface="微軟正黑體" pitchFamily="34" charset="-120"/>
+                <a:ea typeface="微軟正黑體" pitchFamily="34" charset="-120"/>
+              </a:rPr>
+              <a:t>，</a:t>
+            </a:r>
+            <a:r>
+              <a:rPr lang="zh-TW" altLang="en-US" sz="6400" dirty="0">
+                <a:solidFill>
+                  <a:srgbClr val="660033"/>
+                </a:solidFill>
+                <a:latin typeface="微軟正黑體" pitchFamily="34" charset="-120"/>
+                <a:ea typeface="微軟正黑體" pitchFamily="34" charset="-120"/>
+              </a:rPr>
+              <a:t>因為父要這樣的人</a:t>
+            </a:r>
+            <a:r>
+              <a:rPr lang="zh-TW" altLang="en-US" sz="6400" dirty="0" smtClean="0">
+                <a:solidFill>
+                  <a:srgbClr val="660033"/>
+                </a:solidFill>
+                <a:latin typeface="微軟正黑體" pitchFamily="34" charset="-120"/>
+                <a:ea typeface="微軟正黑體" pitchFamily="34" charset="-120"/>
+              </a:rPr>
+              <a:t>拜</a:t>
+            </a:r>
+            <a:r>
+              <a:rPr lang="zh-CN" altLang="en-US" sz="6400" dirty="0">
+                <a:solidFill>
+                  <a:srgbClr val="660033"/>
+                </a:solidFill>
+                <a:latin typeface="微軟正黑體" pitchFamily="34" charset="-120"/>
+                <a:ea typeface="微軟正黑體" pitchFamily="34" charset="-120"/>
+              </a:rPr>
+              <a:t>祂</a:t>
+            </a:r>
+            <a:r>
+              <a:rPr lang="zh-TW" altLang="en-US" sz="6400" dirty="0" smtClean="0">
+                <a:solidFill>
+                  <a:srgbClr val="660033"/>
+                </a:solidFill>
+                <a:latin typeface="微軟正黑體" pitchFamily="34" charset="-120"/>
+                <a:ea typeface="微軟正黑體" pitchFamily="34" charset="-120"/>
+              </a:rPr>
+              <a:t>。</a:t>
+            </a:r>
+            <a:r>
+              <a:rPr lang="zh-TW" altLang="en-US" sz="6400" dirty="0">
+                <a:solidFill>
+                  <a:srgbClr val="660033"/>
+                </a:solidFill>
+                <a:latin typeface="微軟正黑體" pitchFamily="34" charset="-120"/>
+                <a:ea typeface="微軟正黑體" pitchFamily="34" charset="-120"/>
+              </a:rPr>
+              <a:t>」</a:t>
             </a:r>
             <a:r>
               <a:rPr lang="en-US" altLang="zh-TW" sz="6600" dirty="0">
@@ -3872,10 +4192,90 @@
                 <a:latin typeface="微軟正黑體" pitchFamily="34" charset="-120"/>
                 <a:ea typeface="微軟正黑體" pitchFamily="34" charset="-120"/>
               </a:rPr>
-              <a:t>是個靈，所以拜他的必須用心靈和誠實拜他。</a:t>
-            </a:r>
-            <a:r>
-              <a:rPr lang="en-US" altLang="zh-TW" sz="6400" b="1" dirty="0">
+              <a:t>是個靈，</a:t>
+            </a:r>
+            <a:r>
+              <a:rPr lang="zh-TW" altLang="en-US" sz="6400" b="1" dirty="0">
+                <a:solidFill>
+                  <a:srgbClr val="660033"/>
+                </a:solidFill>
+                <a:latin typeface="微軟正黑體" pitchFamily="34" charset="-120"/>
+                <a:ea typeface="微軟正黑體" pitchFamily="34" charset="-120"/>
+              </a:rPr>
+              <a:t>所以</a:t>
+            </a:r>
+            <a:r>
+              <a:rPr lang="zh-TW" altLang="en-US" sz="6400" b="1" dirty="0">
+                <a:solidFill>
+                  <a:srgbClr val="660033"/>
+                </a:solidFill>
+                <a:latin typeface="微軟正黑體" pitchFamily="34" charset="-120"/>
+                <a:ea typeface="微軟正黑體" pitchFamily="34" charset="-120"/>
+              </a:rPr>
+              <a:t>拜</a:t>
+            </a:r>
+            <a:r>
+              <a:rPr lang="zh-CN" altLang="en-US" sz="6400" b="1" dirty="0">
+                <a:solidFill>
+                  <a:srgbClr val="660033"/>
+                </a:solidFill>
+                <a:latin typeface="微軟正黑體" pitchFamily="34" charset="-120"/>
+                <a:ea typeface="微軟正黑體" pitchFamily="34" charset="-120"/>
+              </a:rPr>
+              <a:t>祂</a:t>
+            </a:r>
+            <a:r>
+              <a:rPr lang="zh-TW" altLang="en-US" sz="6400" b="1" dirty="0">
+                <a:solidFill>
+                  <a:srgbClr val="660033"/>
+                </a:solidFill>
+                <a:latin typeface="微軟正黑體" pitchFamily="34" charset="-120"/>
+                <a:ea typeface="微軟正黑體" pitchFamily="34" charset="-120"/>
+              </a:rPr>
+              <a:t>的</a:t>
+            </a:r>
+            <a:r>
+              <a:rPr lang="zh-TW" altLang="en-US" sz="6400" b="1" dirty="0">
+                <a:solidFill>
+                  <a:srgbClr val="660033"/>
+                </a:solidFill>
+                <a:latin typeface="微軟正黑體" pitchFamily="34" charset="-120"/>
+                <a:ea typeface="微軟正黑體" pitchFamily="34" charset="-120"/>
+              </a:rPr>
+              <a:t>必須用心靈和誠實</a:t>
+            </a:r>
+            <a:r>
+              <a:rPr lang="zh-TW" altLang="en-US" sz="6400" b="1" dirty="0">
+                <a:solidFill>
+                  <a:srgbClr val="660033"/>
+                </a:solidFill>
+                <a:latin typeface="微軟正黑體" pitchFamily="34" charset="-120"/>
+                <a:ea typeface="微軟正黑體" pitchFamily="34" charset="-120"/>
+              </a:rPr>
+              <a:t>拜</a:t>
+            </a:r>
+            <a:r>
+              <a:rPr lang="zh-CN" altLang="en-US" sz="6400" b="1" dirty="0">
+                <a:solidFill>
+                  <a:srgbClr val="660033"/>
+                </a:solidFill>
+                <a:latin typeface="微軟正黑體" pitchFamily="34" charset="-120"/>
+                <a:ea typeface="微軟正黑體" pitchFamily="34" charset="-120"/>
+              </a:rPr>
+              <a:t>祂</a:t>
+            </a:r>
+            <a:r>
+              <a:rPr lang="zh-TW" altLang="en-US" sz="6400" b="1" dirty="0" smtClean="0">
+                <a:solidFill>
+                  <a:srgbClr val="660033"/>
+                </a:solidFill>
+                <a:latin typeface="微軟正黑體" pitchFamily="34" charset="-120"/>
+                <a:ea typeface="微軟正黑體" pitchFamily="34" charset="-120"/>
+              </a:rPr>
+              <a:t>。</a:t>
+            </a:r>
+            <a:r>
+              <a:rPr lang="en-US" altLang="zh-TW" sz="6400" b="1" dirty="0" smtClean="0">
                 <a:solidFill>
                   <a:srgbClr val="660033"/>
                 </a:solidFill>
@@ -3884,6 +4284,13 @@
               </a:rPr>
               <a:t> </a:t>
             </a:r>
+            <a:endParaRPr lang="en-US" altLang="zh-TW" sz="6400" b="1" dirty="0">
+              <a:solidFill>
+                <a:srgbClr val="660033"/>
+              </a:solidFill>
+              <a:latin typeface="微軟正黑體" pitchFamily="34" charset="-120"/>
+              <a:ea typeface="微軟正黑體" pitchFamily="34" charset="-120"/>
+            </a:endParaRPr>
           </a:p>
         </p:txBody>
       </p:sp>

</xml_diff>